<commit_message>
Add labs for Module 8
</commit_message>
<xml_diff>
--- a/Lab1/Phisical and Logical Models.pptx
+++ b/Lab1/Phisical and Logical Models.pptx
@@ -5,13 +5,12 @@
     <p:sldMasterId id="2147483648" r:id="rId1"/>
   </p:sldMasterIdLst>
   <p:sldIdLst>
-    <p:sldId id="256" r:id="rId2"/>
-    <p:sldId id="257" r:id="rId3"/>
-    <p:sldId id="258" r:id="rId4"/>
-    <p:sldId id="259" r:id="rId5"/>
-    <p:sldId id="260" r:id="rId6"/>
-    <p:sldId id="261" r:id="rId7"/>
-    <p:sldId id="262" r:id="rId8"/>
+    <p:sldId id="257" r:id="rId2"/>
+    <p:sldId id="258" r:id="rId3"/>
+    <p:sldId id="259" r:id="rId4"/>
+    <p:sldId id="260" r:id="rId5"/>
+    <p:sldId id="261" r:id="rId6"/>
+    <p:sldId id="262" r:id="rId7"/>
   </p:sldIdLst>
   <p:sldSz cx="12192000" cy="6858000"/>
   <p:notesSz cx="6858000" cy="9144000"/>
@@ -110,6 +109,11 @@
       </a:defRPr>
     </a:lvl9pPr>
   </p:defaultTextStyle>
+  <p:extLst>
+    <p:ext uri="{EFAFB233-063F-42B5-8137-9DF3F51BA10A}">
+      <p15:sldGuideLst xmlns:p15="http://schemas.microsoft.com/office/powerpoint/2012/main"/>
+    </p:ext>
+  </p:extLst>
 </p:presentation>
 </file>
 
@@ -262,7 +266,7 @@
           <a:p>
             <a:fld id="{41BAE829-DE0B-44E3-8BC9-3F674FCA2B69}" type="datetimeFigureOut">
               <a:rPr lang="en-US" smtClean="0"/>
-              <a:t>6/21/2024</a:t>
+              <a:t>6/23/2024</a:t>
             </a:fld>
             <a:endParaRPr lang="en-US"/>
           </a:p>
@@ -462,7 +466,7 @@
           <a:p>
             <a:fld id="{41BAE829-DE0B-44E3-8BC9-3F674FCA2B69}" type="datetimeFigureOut">
               <a:rPr lang="en-US" smtClean="0"/>
-              <a:t>6/21/2024</a:t>
+              <a:t>6/23/2024</a:t>
             </a:fld>
             <a:endParaRPr lang="en-US"/>
           </a:p>
@@ -672,7 +676,7 @@
           <a:p>
             <a:fld id="{41BAE829-DE0B-44E3-8BC9-3F674FCA2B69}" type="datetimeFigureOut">
               <a:rPr lang="en-US" smtClean="0"/>
-              <a:t>6/21/2024</a:t>
+              <a:t>6/23/2024</a:t>
             </a:fld>
             <a:endParaRPr lang="en-US"/>
           </a:p>
@@ -872,7 +876,7 @@
           <a:p>
             <a:fld id="{41BAE829-DE0B-44E3-8BC9-3F674FCA2B69}" type="datetimeFigureOut">
               <a:rPr lang="en-US" smtClean="0"/>
-              <a:t>6/21/2024</a:t>
+              <a:t>6/23/2024</a:t>
             </a:fld>
             <a:endParaRPr lang="en-US"/>
           </a:p>
@@ -1148,7 +1152,7 @@
           <a:p>
             <a:fld id="{41BAE829-DE0B-44E3-8BC9-3F674FCA2B69}" type="datetimeFigureOut">
               <a:rPr lang="en-US" smtClean="0"/>
-              <a:t>6/21/2024</a:t>
+              <a:t>6/23/2024</a:t>
             </a:fld>
             <a:endParaRPr lang="en-US"/>
           </a:p>
@@ -1416,7 +1420,7 @@
           <a:p>
             <a:fld id="{41BAE829-DE0B-44E3-8BC9-3F674FCA2B69}" type="datetimeFigureOut">
               <a:rPr lang="en-US" smtClean="0"/>
-              <a:t>6/21/2024</a:t>
+              <a:t>6/23/2024</a:t>
             </a:fld>
             <a:endParaRPr lang="en-US"/>
           </a:p>
@@ -1831,7 +1835,7 @@
           <a:p>
             <a:fld id="{41BAE829-DE0B-44E3-8BC9-3F674FCA2B69}" type="datetimeFigureOut">
               <a:rPr lang="en-US" smtClean="0"/>
-              <a:t>6/21/2024</a:t>
+              <a:t>6/23/2024</a:t>
             </a:fld>
             <a:endParaRPr lang="en-US"/>
           </a:p>
@@ -1973,7 +1977,7 @@
           <a:p>
             <a:fld id="{41BAE829-DE0B-44E3-8BC9-3F674FCA2B69}" type="datetimeFigureOut">
               <a:rPr lang="en-US" smtClean="0"/>
-              <a:t>6/21/2024</a:t>
+              <a:t>6/23/2024</a:t>
             </a:fld>
             <a:endParaRPr lang="en-US"/>
           </a:p>
@@ -2086,7 +2090,7 @@
           <a:p>
             <a:fld id="{41BAE829-DE0B-44E3-8BC9-3F674FCA2B69}" type="datetimeFigureOut">
               <a:rPr lang="en-US" smtClean="0"/>
-              <a:t>6/21/2024</a:t>
+              <a:t>6/23/2024</a:t>
             </a:fld>
             <a:endParaRPr lang="en-US"/>
           </a:p>
@@ -2399,7 +2403,7 @@
           <a:p>
             <a:fld id="{41BAE829-DE0B-44E3-8BC9-3F674FCA2B69}" type="datetimeFigureOut">
               <a:rPr lang="en-US" smtClean="0"/>
-              <a:t>6/21/2024</a:t>
+              <a:t>6/23/2024</a:t>
             </a:fld>
             <a:endParaRPr lang="en-US"/>
           </a:p>
@@ -2688,7 +2692,7 @@
           <a:p>
             <a:fld id="{41BAE829-DE0B-44E3-8BC9-3F674FCA2B69}" type="datetimeFigureOut">
               <a:rPr lang="en-US" smtClean="0"/>
-              <a:t>6/21/2024</a:t>
+              <a:t>6/23/2024</a:t>
             </a:fld>
             <a:endParaRPr lang="en-US"/>
           </a:p>
@@ -2931,7 +2935,7 @@
           <a:p>
             <a:fld id="{41BAE829-DE0B-44E3-8BC9-3F674FCA2B69}" type="datetimeFigureOut">
               <a:rPr lang="en-US" smtClean="0"/>
-              <a:t>6/21/2024</a:t>
+              <a:t>6/23/2024</a:t>
             </a:fld>
             <a:endParaRPr lang="en-US"/>
           </a:p>
@@ -3348,86 +3352,6 @@
           <a:chExt cx="0" cy="0"/>
         </a:xfrm>
       </p:grpSpPr>
-      <p:sp>
-        <p:nvSpPr>
-          <p:cNvPr id="2" name="Título 1">
-            <a:extLst>
-              <a:ext uri="{FF2B5EF4-FFF2-40B4-BE49-F238E27FC236}">
-                <a16:creationId xmlns:a16="http://schemas.microsoft.com/office/drawing/2014/main" id="{F2447278-B523-5452-6047-DA89A0515454}"/>
-              </a:ext>
-            </a:extLst>
-          </p:cNvPr>
-          <p:cNvSpPr>
-            <a:spLocks noGrp="1"/>
-          </p:cNvSpPr>
-          <p:nvPr>
-            <p:ph type="ctrTitle"/>
-          </p:nvPr>
-        </p:nvSpPr>
-        <p:spPr/>
-        <p:txBody>
-          <a:bodyPr/>
-          <a:lstStyle/>
-          <a:p>
-            <a:endParaRPr lang="en-US"/>
-          </a:p>
-        </p:txBody>
-      </p:sp>
-      <p:sp>
-        <p:nvSpPr>
-          <p:cNvPr id="3" name="Subtítulo 2">
-            <a:extLst>
-              <a:ext uri="{FF2B5EF4-FFF2-40B4-BE49-F238E27FC236}">
-                <a16:creationId xmlns:a16="http://schemas.microsoft.com/office/drawing/2014/main" id="{D3EC1F2F-3501-24CF-0FD3-032EB3349D21}"/>
-              </a:ext>
-            </a:extLst>
-          </p:cNvPr>
-          <p:cNvSpPr>
-            <a:spLocks noGrp="1"/>
-          </p:cNvSpPr>
-          <p:nvPr>
-            <p:ph type="subTitle" idx="1"/>
-          </p:nvPr>
-        </p:nvSpPr>
-        <p:spPr/>
-        <p:txBody>
-          <a:bodyPr/>
-          <a:lstStyle/>
-          <a:p>
-            <a:endParaRPr lang="en-US"/>
-          </a:p>
-        </p:txBody>
-      </p:sp>
-    </p:spTree>
-    <p:extLst>
-      <p:ext uri="{BB962C8B-B14F-4D97-AF65-F5344CB8AC3E}">
-        <p14:creationId xmlns:p14="http://schemas.microsoft.com/office/powerpoint/2010/main" val="2808596184"/>
-      </p:ext>
-    </p:extLst>
-  </p:cSld>
-  <p:clrMapOvr>
-    <a:masterClrMapping/>
-  </p:clrMapOvr>
-</p:sld>
-</file>
-
-<file path=ppt/slides/slide2.xml><?xml version="1.0" encoding="utf-8"?>
-<p:sld xmlns:a="http://schemas.openxmlformats.org/drawingml/2006/main" xmlns:r="http://schemas.openxmlformats.org/officeDocument/2006/relationships" xmlns:p="http://schemas.openxmlformats.org/presentationml/2006/main">
-  <p:cSld>
-    <p:spTree>
-      <p:nvGrpSpPr>
-        <p:cNvPr id="1" name=""/>
-        <p:cNvGrpSpPr/>
-        <p:nvPr/>
-      </p:nvGrpSpPr>
-      <p:grpSpPr>
-        <a:xfrm>
-          <a:off x="0" y="0"/>
-          <a:ext cx="0" cy="0"/>
-          <a:chOff x="0" y="0"/>
-          <a:chExt cx="0" cy="0"/>
-        </a:xfrm>
-      </p:grpSpPr>
       <p:pic>
         <p:nvPicPr>
           <p:cNvPr id="5" name="Imagen 4">
@@ -3471,7 +3395,7 @@
 </p:sld>
 </file>
 
-<file path=ppt/slides/slide3.xml><?xml version="1.0" encoding="utf-8"?>
+<file path=ppt/slides/slide2.xml><?xml version="1.0" encoding="utf-8"?>
 <p:sld xmlns:a="http://schemas.openxmlformats.org/drawingml/2006/main" xmlns:r="http://schemas.openxmlformats.org/officeDocument/2006/relationships" xmlns:p="http://schemas.openxmlformats.org/presentationml/2006/main">
   <p:cSld>
     <p:spTree>
@@ -3531,7 +3455,7 @@
 </p:sld>
 </file>
 
-<file path=ppt/slides/slide4.xml><?xml version="1.0" encoding="utf-8"?>
+<file path=ppt/slides/slide3.xml><?xml version="1.0" encoding="utf-8"?>
 <p:sld xmlns:a="http://schemas.openxmlformats.org/drawingml/2006/main" xmlns:r="http://schemas.openxmlformats.org/officeDocument/2006/relationships" xmlns:p="http://schemas.openxmlformats.org/presentationml/2006/main">
   <p:cSld>
     <p:spTree>
@@ -3591,7 +3515,7 @@
 </p:sld>
 </file>
 
-<file path=ppt/slides/slide5.xml><?xml version="1.0" encoding="utf-8"?>
+<file path=ppt/slides/slide4.xml><?xml version="1.0" encoding="utf-8"?>
 <p:sld xmlns:a="http://schemas.openxmlformats.org/drawingml/2006/main" xmlns:r="http://schemas.openxmlformats.org/officeDocument/2006/relationships" xmlns:p="http://schemas.openxmlformats.org/presentationml/2006/main">
   <p:cSld>
     <p:spTree>
@@ -3651,7 +3575,7 @@
 </p:sld>
 </file>
 
-<file path=ppt/slides/slide6.xml><?xml version="1.0" encoding="utf-8"?>
+<file path=ppt/slides/slide5.xml><?xml version="1.0" encoding="utf-8"?>
 <p:sld xmlns:a="http://schemas.openxmlformats.org/drawingml/2006/main" xmlns:r="http://schemas.openxmlformats.org/officeDocument/2006/relationships" xmlns:p="http://schemas.openxmlformats.org/presentationml/2006/main">
   <p:cSld>
     <p:spTree>
@@ -3711,7 +3635,7 @@
 </p:sld>
 </file>
 
-<file path=ppt/slides/slide7.xml><?xml version="1.0" encoding="utf-8"?>
+<file path=ppt/slides/slide6.xml><?xml version="1.0" encoding="utf-8"?>
 <p:sld xmlns:a="http://schemas.openxmlformats.org/drawingml/2006/main" xmlns:r="http://schemas.openxmlformats.org/officeDocument/2006/relationships" xmlns:p="http://schemas.openxmlformats.org/presentationml/2006/main">
   <p:cSld>
     <p:spTree>

</xml_diff>